<commit_message>
add W3 patterns to slide
</commit_message>
<xml_diff>
--- a/Documents/Week2_Project_Design.pptx
+++ b/Documents/Week2_Project_Design.pptx
@@ -10,6 +10,7 @@
     <p:sldId id="258" r:id="rId4"/>
     <p:sldId id="259" r:id="rId5"/>
     <p:sldId id="260" r:id="rId6"/>
+    <p:sldId id="261" r:id="rId7"/>
   </p:sldIdLst>
   <p:sldSz cx="12192000" cy="6858000"/>
   <p:notesSz cx="6858000" cy="9144000"/>
@@ -4892,7 +4893,7 @@
               <a:t>④　</a:t>
             </a:r>
             <a:r>
-              <a:rPr lang="vi-VN" altLang="ja-JP" smtClean="0"/>
+              <a:rPr lang="vi-VN" altLang="ja-JP" dirty="0" smtClean="0"/>
               <a:t>Implement real card dealing logic : Thịnh</a:t>
             </a:r>
           </a:p>
@@ -4902,6 +4903,139 @@
     <p:extLst>
       <p:ext uri="{BB962C8B-B14F-4D97-AF65-F5344CB8AC3E}">
         <p14:creationId xmlns:p14="http://schemas.microsoft.com/office/powerpoint/2010/main" val="1036774800"/>
+      </p:ext>
+    </p:extLst>
+  </p:cSld>
+  <p:clrMapOvr>
+    <a:masterClrMapping/>
+  </p:clrMapOvr>
+</p:sld>
+</file>
+
+<file path=ppt/slides/slide6.xml><?xml version="1.0" encoding="utf-8"?>
+<p:sld xmlns:a="http://schemas.openxmlformats.org/drawingml/2006/main" xmlns:r="http://schemas.openxmlformats.org/officeDocument/2006/relationships" xmlns:p="http://schemas.openxmlformats.org/presentationml/2006/main">
+  <p:cSld>
+    <p:spTree>
+      <p:nvGrpSpPr>
+        <p:cNvPr id="1" name=""/>
+        <p:cNvGrpSpPr/>
+        <p:nvPr/>
+      </p:nvGrpSpPr>
+      <p:grpSpPr>
+        <a:xfrm>
+          <a:off x="0" y="0"/>
+          <a:ext cx="0" cy="0"/>
+          <a:chOff x="0" y="0"/>
+          <a:chExt cx="0" cy="0"/>
+        </a:xfrm>
+      </p:grpSpPr>
+      <p:sp>
+        <p:nvSpPr>
+          <p:cNvPr id="2" name="Title 1"/>
+          <p:cNvSpPr>
+            <a:spLocks noGrp="1"/>
+          </p:cNvSpPr>
+          <p:nvPr>
+            <p:ph type="title"/>
+          </p:nvPr>
+        </p:nvSpPr>
+        <p:spPr/>
+        <p:txBody>
+          <a:bodyPr/>
+          <a:lstStyle/>
+          <a:p>
+            <a:r>
+              <a:rPr lang="en-US" dirty="0" smtClean="0"/>
+              <a:t>Next Week</a:t>
+            </a:r>
+            <a:endParaRPr lang="en-US" dirty="0"/>
+          </a:p>
+        </p:txBody>
+      </p:sp>
+      <p:sp>
+        <p:nvSpPr>
+          <p:cNvPr id="3" name="Content Placeholder 2"/>
+          <p:cNvSpPr>
+            <a:spLocks noGrp="1"/>
+          </p:cNvSpPr>
+          <p:nvPr>
+            <p:ph idx="1"/>
+          </p:nvPr>
+        </p:nvSpPr>
+        <p:spPr/>
+        <p:txBody>
+          <a:bodyPr/>
+          <a:lstStyle/>
+          <a:p>
+            <a:r>
+              <a:rPr lang="en-US" dirty="0" err="1" smtClean="0"/>
+              <a:t>StatePattern</a:t>
+            </a:r>
+            <a:r>
+              <a:rPr lang="en-US" dirty="0" smtClean="0"/>
+              <a:t>:</a:t>
+            </a:r>
+          </a:p>
+          <a:p>
+            <a:pPr marL="0" indent="0">
+              <a:buNone/>
+            </a:pPr>
+            <a:r>
+              <a:rPr lang="en-US" dirty="0"/>
+              <a:t>https://</a:t>
+            </a:r>
+            <a:r>
+              <a:rPr lang="en-US" dirty="0" err="1"/>
+              <a:t>en.wikipedia.org</a:t>
+            </a:r>
+            <a:r>
+              <a:rPr lang="en-US" dirty="0"/>
+              <a:t>/wiki/</a:t>
+            </a:r>
+            <a:r>
+              <a:rPr lang="en-US" dirty="0" err="1"/>
+              <a:t>State_pattern</a:t>
+            </a:r>
+            <a:endParaRPr lang="en-US" dirty="0"/>
+          </a:p>
+          <a:p>
+            <a:r>
+              <a:rPr lang="en-US" dirty="0" err="1" smtClean="0"/>
+              <a:t>ObseverPattern</a:t>
+            </a:r>
+            <a:r>
+              <a:rPr lang="en-US" dirty="0" smtClean="0"/>
+              <a:t>:</a:t>
+            </a:r>
+          </a:p>
+          <a:p>
+            <a:pPr marL="0" indent="0">
+              <a:buNone/>
+            </a:pPr>
+            <a:r>
+              <a:rPr lang="en-US" dirty="0"/>
+              <a:t>http://</a:t>
+            </a:r>
+            <a:r>
+              <a:rPr lang="en-US" dirty="0" err="1"/>
+              <a:t>www.oodesign.com</a:t>
+            </a:r>
+            <a:r>
+              <a:rPr lang="en-US" dirty="0"/>
+              <a:t>/observer-</a:t>
+            </a:r>
+            <a:r>
+              <a:rPr lang="en-US"/>
+              <a:t>pattern.html</a:t>
+            </a:r>
+            <a:endParaRPr lang="en-US" dirty="0"/>
+          </a:p>
+        </p:txBody>
+      </p:sp>
+    </p:spTree>
+    <p:extLst>
+      <p:ext uri="{BB962C8B-B14F-4D97-AF65-F5344CB8AC3E}">
+        <p14:creationId xmlns:p14="http://schemas.microsoft.com/office/powerpoint/2010/main" val="1327788064"/>
       </p:ext>
     </p:extLst>
   </p:cSld>

</xml_diff>